<commit_message>
solution for week 4
</commit_message>
<xml_diff>
--- a/classrooms/week 04/Methods2-week4.pptx
+++ b/classrooms/week 04/Methods2-week4.pptx
@@ -222,14 +222,6 @@
     </p:ext>
   </p:extLst>
 </p:presentation>
-</file>
-
-<file path=ppt/revisionInfo.xml><?xml version="1.0" encoding="utf-8"?>
-<p1510:revInfo xmlns:a="http://schemas.openxmlformats.org/drawingml/2006/main" xmlns:r="http://schemas.openxmlformats.org/officeDocument/2006/relationships" xmlns:p1510="http://schemas.microsoft.com/office/powerpoint/2015/10/main">
-  <p1510:revLst>
-    <p1510:client id="{A229185B-2C01-4FEC-82EC-02F979CF2755}" v="3" dt="2023-02-27T09:17:51.007"/>
-  </p1510:revLst>
-</p1510:revInfo>
 </file>
 
 <file path=ppt/handoutMasters/handoutMaster1.xml><?xml version="1.0" encoding="utf-8"?>
@@ -9525,8 +9517,12 @@
           </a:p>
           <a:p>
             <a:r>
+              <a:rPr lang="en-GB"/>
+              <a:t>I can </a:t>
+            </a:r>
+            <a:r>
               <a:rPr lang="en-GB" dirty="0"/>
-              <a:t>I will guide the first exercises</a:t>
+              <a:t>guide the first exercises</a:t>
             </a:r>
           </a:p>
           <a:p>

</xml_diff>

<commit_message>
solution for week 7
</commit_message>
<xml_diff>
--- a/classrooms/week 04/Methods2-week4.pptx
+++ b/classrooms/week 04/Methods2-week4.pptx
@@ -1648,7 +1648,7 @@
             <a:fld id="{78417F83-4CBA-48F2-BAD0-783AE3701E32}" type="datetimeFigureOut">
               <a:rPr lang="en-GB" smtClean="0"/>
               <a:pPr/>
-              <a:t>01/03/2023</a:t>
+              <a:t>04/03/2023</a:t>
             </a:fld>
             <a:r>
               <a:rPr lang="en-GB" dirty="0"/>
@@ -1858,7 +1858,7 @@
             <a:fld id="{78417F83-4CBA-48F2-BAD0-783AE3701E32}" type="datetimeFigureOut">
               <a:rPr lang="en-GB" smtClean="0"/>
               <a:pPr/>
-              <a:t>01/03/2023</a:t>
+              <a:t>04/03/2023</a:t>
             </a:fld>
             <a:r>
               <a:rPr lang="en-GB" dirty="0"/>
@@ -2099,7 +2099,7 @@
             <a:fld id="{78417F83-4CBA-48F2-BAD0-783AE3701E32}" type="datetimeFigureOut">
               <a:rPr lang="en-GB" smtClean="0"/>
               <a:pPr/>
-              <a:t>01/03/2023</a:t>
+              <a:t>04/03/2023</a:t>
             </a:fld>
             <a:r>
               <a:rPr lang="en-GB" dirty="0"/>
@@ -2269,7 +2269,7 @@
             <a:fld id="{78417F83-4CBA-48F2-BAD0-783AE3701E32}" type="datetimeFigureOut">
               <a:rPr lang="en-GB" smtClean="0"/>
               <a:pPr/>
-              <a:t>01/03/2023</a:t>
+              <a:t>04/03/2023</a:t>
             </a:fld>
             <a:r>
               <a:rPr lang="en-GB" dirty="0"/>
@@ -2443,7 +2443,7 @@
             <a:fld id="{78417F83-4CBA-48F2-BAD0-783AE3701E32}" type="datetimeFigureOut">
               <a:rPr lang="en-GB" smtClean="0"/>
               <a:pPr/>
-              <a:t>01/03/2023</a:t>
+              <a:t>04/03/2023</a:t>
             </a:fld>
             <a:r>
               <a:rPr lang="en-GB" dirty="0"/>
@@ -2780,7 +2780,7 @@
             <a:fld id="{78417F83-4CBA-48F2-BAD0-783AE3701E32}" type="datetimeFigureOut">
               <a:rPr lang="en-GB" smtClean="0"/>
               <a:pPr/>
-              <a:t>01/03/2023</a:t>
+              <a:t>04/03/2023</a:t>
             </a:fld>
             <a:r>
               <a:rPr lang="en-GB" dirty="0"/>
@@ -2951,7 +2951,7 @@
             <a:fld id="{78417F83-4CBA-48F2-BAD0-783AE3701E32}" type="datetimeFigureOut">
               <a:rPr lang="en-GB" smtClean="0"/>
               <a:pPr/>
-              <a:t>01/03/2023</a:t>
+              <a:t>04/03/2023</a:t>
             </a:fld>
             <a:r>
               <a:rPr lang="en-GB" dirty="0"/>
@@ -3147,7 +3147,7 @@
             <a:fld id="{78417F83-4CBA-48F2-BAD0-783AE3701E32}" type="datetimeFigureOut">
               <a:rPr lang="en-GB" smtClean="0"/>
               <a:pPr/>
-              <a:t>01/03/2023</a:t>
+              <a:t>04/03/2023</a:t>
             </a:fld>
             <a:r>
               <a:rPr lang="en-GB" dirty="0"/>
@@ -3316,7 +3316,7 @@
             <a:fld id="{78417F83-4CBA-48F2-BAD0-783AE3701E32}" type="datetimeFigureOut">
               <a:rPr lang="en-GB" smtClean="0"/>
               <a:pPr/>
-              <a:t>01/03/2023</a:t>
+              <a:t>04/03/2023</a:t>
             </a:fld>
             <a:r>
               <a:rPr lang="en-GB" dirty="0"/>
@@ -3470,7 +3470,7 @@
             <a:fld id="{78417F83-4CBA-48F2-BAD0-783AE3701E32}" type="datetimeFigureOut">
               <a:rPr lang="en-GB" smtClean="0"/>
               <a:pPr/>
-              <a:t>01/03/2023</a:t>
+              <a:t>04/03/2023</a:t>
             </a:fld>
             <a:r>
               <a:rPr lang="en-GB" dirty="0"/>
@@ -4359,7 +4359,7 @@
             <a:fld id="{78417F83-4CBA-48F2-BAD0-783AE3701E32}" type="datetimeFigureOut">
               <a:rPr lang="en-GB" smtClean="0"/>
               <a:pPr/>
-              <a:t>01/03/2023</a:t>
+              <a:t>04/03/2023</a:t>
             </a:fld>
             <a:r>
               <a:rPr lang="en-GB" dirty="0"/>
@@ -5191,7 +5191,7 @@
             <a:fld id="{78417F83-4CBA-48F2-BAD0-783AE3701E32}" type="datetimeFigureOut">
               <a:rPr lang="en-GB" smtClean="0"/>
               <a:pPr/>
-              <a:t>01/03/2023</a:t>
+              <a:t>04/03/2023</a:t>
             </a:fld>
             <a:r>
               <a:rPr lang="en-GB" dirty="0"/>
@@ -5421,7 +5421,7 @@
             <a:fld id="{78417F83-4CBA-48F2-BAD0-783AE3701E32}" type="datetimeFigureOut">
               <a:rPr lang="en-GB" smtClean="0"/>
               <a:pPr/>
-              <a:t>01/03/2023</a:t>
+              <a:t>04/03/2023</a:t>
             </a:fld>
             <a:r>
               <a:rPr lang="en-GB" dirty="0"/>
@@ -6137,7 +6137,7 @@
             <a:fld id="{78417F83-4CBA-48F2-BAD0-783AE3701E32}" type="datetimeFigureOut">
               <a:rPr lang="en-GB" smtClean="0"/>
               <a:pPr/>
-              <a:t>01/03/2023</a:t>
+              <a:t>04/03/2023</a:t>
             </a:fld>
             <a:r>
               <a:rPr lang="en-GB" dirty="0"/>
@@ -6428,7 +6428,7 @@
             <a:fld id="{78417F83-4CBA-48F2-BAD0-783AE3701E32}" type="datetimeFigureOut">
               <a:rPr lang="en-GB" smtClean="0"/>
               <a:pPr/>
-              <a:t>01/03/2023</a:t>
+              <a:t>04/03/2023</a:t>
             </a:fld>
             <a:r>
               <a:rPr lang="en-GB" dirty="0"/>
@@ -6797,7 +6797,7 @@
             <a:fld id="{78417F83-4CBA-48F2-BAD0-783AE3701E32}" type="datetimeFigureOut">
               <a:rPr lang="en-GB" smtClean="0"/>
               <a:pPr/>
-              <a:t>01/03/2023</a:t>
+              <a:t>04/03/2023</a:t>
             </a:fld>
             <a:r>
               <a:rPr lang="en-GB" dirty="0"/>
@@ -7224,7 +7224,7 @@
             <a:fld id="{78417F83-4CBA-48F2-BAD0-783AE3701E32}" type="datetimeFigureOut">
               <a:rPr lang="en-GB" smtClean="0"/>
               <a:pPr/>
-              <a:t>01/03/2023</a:t>
+              <a:t>04/03/2023</a:t>
             </a:fld>
             <a:r>
               <a:rPr lang="en-GB" dirty="0"/>
@@ -7664,7 +7664,7 @@
             <a:fld id="{78417F83-4CBA-48F2-BAD0-783AE3701E32}" type="datetimeFigureOut">
               <a:rPr lang="en-GB" smtClean="0"/>
               <a:pPr/>
-              <a:t>01/03/2023</a:t>
+              <a:t>04/03/2023</a:t>
             </a:fld>
             <a:r>
               <a:rPr lang="en-GB" dirty="0"/>
@@ -7832,7 +7832,7 @@
             <a:fld id="{78417F83-4CBA-48F2-BAD0-783AE3701E32}" type="datetimeFigureOut">
               <a:rPr lang="en-GB" smtClean="0"/>
               <a:pPr/>
-              <a:t>01/03/2023</a:t>
+              <a:t>04/03/2023</a:t>
             </a:fld>
             <a:r>
               <a:rPr lang="en-GB" dirty="0"/>
@@ -8013,7 +8013,7 @@
             <a:fld id="{78417F83-4CBA-48F2-BAD0-783AE3701E32}" type="datetimeFigureOut">
               <a:rPr lang="en-GB" smtClean="0"/>
               <a:pPr/>
-              <a:t>01/03/2023</a:t>
+              <a:t>04/03/2023</a:t>
             </a:fld>
             <a:r>
               <a:rPr lang="en-GB" dirty="0"/>
@@ -8795,7 +8795,7 @@
             <a:fld id="{78417F83-4CBA-48F2-BAD0-783AE3701E32}" type="datetimeFigureOut">
               <a:rPr lang="en-GB" smtClean="0"/>
               <a:pPr/>
-              <a:t>01/03/2023</a:t>
+              <a:t>04/03/2023</a:t>
             </a:fld>
             <a:r>
               <a:rPr lang="en-GB"/>
@@ -9418,8 +9418,12 @@
               <a:rPr lang="en-GB" dirty="0"/>
             </a:br>
             <a:r>
+              <a:rPr lang="en-GB" sz="3600"/>
+              <a:t>Classroom </a:t>
+            </a:r>
+            <a:r>
               <a:rPr lang="en-GB" sz="3600" dirty="0"/>
-              <a:t>Classroom 4</a:t>
+              <a:t>4</a:t>
             </a:r>
           </a:p>
         </p:txBody>
@@ -9517,12 +9521,8 @@
           </a:p>
           <a:p>
             <a:r>
-              <a:rPr lang="en-GB"/>
-              <a:t>I can </a:t>
-            </a:r>
-            <a:r>
               <a:rPr lang="en-GB" dirty="0"/>
-              <a:t>guide the first exercises</a:t>
+              <a:t>I can guide the first exercises</a:t>
             </a:r>
           </a:p>
           <a:p>
@@ -9606,7 +9606,7 @@
           <a:p>
             <a:fld id="{9DB89E37-F115-479D-BCB7-5765C6343F13}" type="datetime1">
               <a:rPr lang="en-GB" smtClean="0"/>
-              <a:t>01/03/2023</a:t>
+              <a:t>04/03/2023</a:t>
             </a:fld>
             <a:r>
               <a:rPr lang="en-GB"/>
@@ -9845,7 +9845,7 @@
           <a:p>
             <a:fld id="{A137781B-B082-4058-B2CB-C7AE31E52921}" type="datetime1">
               <a:rPr lang="en-GB" smtClean="0"/>
-              <a:t>01/03/2023</a:t>
+              <a:t>04/03/2023</a:t>
             </a:fld>
             <a:r>
               <a:rPr lang="en-GB"/>
@@ -10014,7 +10014,7 @@
           <a:p>
             <a:fld id="{5DC9EB23-874B-49BE-988B-3BE50F0F370D}" type="datetime1">
               <a:rPr lang="en-GB" smtClean="0"/>
-              <a:t>01/03/2023</a:t>
+              <a:t>04/03/2023</a:t>
             </a:fld>
             <a:r>
               <a:rPr lang="en-GB"/>
@@ -10135,7 +10135,7 @@
           <a:p>
             <a:fld id="{EAA10417-F3C6-4C97-912B-997C38BCFD61}" type="datetime1">
               <a:rPr lang="en-GB" smtClean="0"/>
-              <a:t>01/03/2023</a:t>
+              <a:t>04/03/2023</a:t>
             </a:fld>
             <a:r>
               <a:rPr lang="en-GB"/>
@@ -10270,7 +10270,7 @@
           <a:p>
             <a:fld id="{7BC3EEDF-7679-4E4D-B8AD-065BDFE4553B}" type="datetime1">
               <a:rPr lang="en-GB" smtClean="0"/>
-              <a:t>01/03/2023</a:t>
+              <a:t>04/03/2023</a:t>
             </a:fld>
             <a:r>
               <a:rPr lang="en-GB"/>

</xml_diff>